<commit_message>
Allow hold note creation
</commit_message>
<xml_diff>
--- a/Assets/Designs/DesignPlan.pptx
+++ b/Assets/Designs/DesignPlan.pptx
@@ -212,7 +212,7 @@
           <a:p>
             <a:fld id="{0F9B84EA-7D68-4D60-9CB1-D50884785D1C}" type="datetimeFigureOut">
               <a:rPr lang="zh-CN" altLang="en-US" smtClean="0"/>
-              <a:t>2024/9/23</a:t>
+              <a:t>2024/9/25</a:t>
             </a:fld>
             <a:endParaRPr lang="zh-CN" altLang="en-US"/>
           </a:p>
@@ -377,7 +377,7 @@
           <a:p>
             <a:fld id="{D6C8D182-E4C8-4120-9249-FC9774456FFA}" type="datetimeFigureOut">
               <a:rPr lang="zh-CN" altLang="en-US" smtClean="0"/>
-              <a:t>2024/9/23</a:t>
+              <a:t>2024/9/25</a:t>
             </a:fld>
             <a:endParaRPr lang="zh-CN" altLang="en-US"/>
           </a:p>
@@ -719,7 +719,7 @@
           <a:p>
             <a:fld id="{760FBDFE-C587-4B4C-A407-44438C67B59E}" type="datetimeFigureOut">
               <a:rPr lang="zh-CN" altLang="en-US" smtClean="0"/>
-              <a:t>2024/9/23</a:t>
+              <a:t>2024/9/25</a:t>
             </a:fld>
             <a:endParaRPr lang="zh-CN" altLang="en-US"/>
           </a:p>
@@ -885,7 +885,7 @@
           <a:p>
             <a:fld id="{760FBDFE-C587-4B4C-A407-44438C67B59E}" type="datetimeFigureOut">
               <a:rPr lang="zh-CN" altLang="en-US" smtClean="0"/>
-              <a:t>2024/9/23</a:t>
+              <a:t>2024/9/25</a:t>
             </a:fld>
             <a:endParaRPr lang="zh-CN" altLang="en-US"/>
           </a:p>
@@ -1185,7 +1185,7 @@
           <a:p>
             <a:fld id="{760FBDFE-C587-4B4C-A407-44438C67B59E}" type="datetimeFigureOut">
               <a:rPr lang="zh-CN" altLang="en-US" smtClean="0"/>
-              <a:t>2024/9/23</a:t>
+              <a:t>2024/9/25</a:t>
             </a:fld>
             <a:endParaRPr lang="zh-CN" altLang="en-US"/>
           </a:p>
@@ -1437,7 +1437,7 @@
           <a:p>
             <a:fld id="{760FBDFE-C587-4B4C-A407-44438C67B59E}" type="datetimeFigureOut">
               <a:rPr lang="zh-CN" altLang="en-US" smtClean="0"/>
-              <a:t>2024/9/23</a:t>
+              <a:t>2024/9/25</a:t>
             </a:fld>
             <a:endParaRPr lang="zh-CN" altLang="en-US"/>
           </a:p>
@@ -1820,7 +1820,7 @@
           <a:p>
             <a:fld id="{760FBDFE-C587-4B4C-A407-44438C67B59E}" type="datetimeFigureOut">
               <a:rPr lang="zh-CN" altLang="en-US" smtClean="0"/>
-              <a:t>2024/9/23</a:t>
+              <a:t>2024/9/25</a:t>
             </a:fld>
             <a:endParaRPr lang="zh-CN" altLang="en-US"/>
           </a:p>
@@ -2187,7 +2187,7 @@
           <a:p>
             <a:fld id="{760FBDFE-C587-4B4C-A407-44438C67B59E}" type="datetimeFigureOut">
               <a:rPr lang="zh-CN" altLang="en-US" smtClean="0"/>
-              <a:t>2024/9/23</a:t>
+              <a:t>2024/9/25</a:t>
             </a:fld>
             <a:endParaRPr lang="zh-CN" altLang="en-US"/>
           </a:p>
@@ -2318,7 +2318,7 @@
           <a:p>
             <a:fld id="{760FBDFE-C587-4B4C-A407-44438C67B59E}" type="datetimeFigureOut">
               <a:rPr lang="zh-CN" altLang="en-US" smtClean="0"/>
-              <a:t>2024/9/23</a:t>
+              <a:t>2024/9/25</a:t>
             </a:fld>
             <a:endParaRPr lang="zh-CN" altLang="en-US"/>
           </a:p>
@@ -2408,7 +2408,7 @@
           <a:p>
             <a:fld id="{760FBDFE-C587-4B4C-A407-44438C67B59E}" type="datetimeFigureOut">
               <a:rPr lang="zh-CN" altLang="en-US" smtClean="0"/>
-              <a:t>2024/9/23</a:t>
+              <a:t>2024/9/25</a:t>
             </a:fld>
             <a:endParaRPr lang="zh-CN" altLang="en-US"/>
           </a:p>
@@ -2672,7 +2672,7 @@
           <a:p>
             <a:fld id="{9EFD9D74-47D9-4702-A33C-335B63B48DBF}" type="datetimeFigureOut">
               <a:rPr lang="zh-CN" altLang="en-US" smtClean="0"/>
-              <a:t>2024/9/23</a:t>
+              <a:t>2024/9/25</a:t>
             </a:fld>
             <a:endParaRPr lang="zh-CN" altLang="en-US" dirty="0"/>
           </a:p>
@@ -2883,7 +2883,7 @@
           <a:p>
             <a:fld id="{760FBDFE-C587-4B4C-A407-44438C67B59E}" type="datetimeFigureOut">
               <a:rPr lang="zh-CN" altLang="en-US" smtClean="0"/>
-              <a:t>2024/9/23</a:t>
+              <a:t>2024/9/25</a:t>
             </a:fld>
             <a:endParaRPr lang="zh-CN" altLang="en-US"/>
           </a:p>
@@ -3096,7 +3096,7 @@
           <a:p>
             <a:fld id="{760FBDFE-C587-4B4C-A407-44438C67B59E}" type="datetimeFigureOut">
               <a:rPr lang="zh-CN" altLang="en-US" smtClean="0"/>
-              <a:t>2024/9/23</a:t>
+              <a:t>2024/9/25</a:t>
             </a:fld>
             <a:endParaRPr lang="zh-CN" altLang="en-US"/>
           </a:p>
@@ -5778,6 +5778,271 @@
           </a:effectLst>
         </p:spPr>
       </p:pic>
+      <p:grpSp>
+        <p:nvGrpSpPr>
+          <p:cNvPr id="5" name="Group 4">
+            <a:extLst>
+              <a:ext uri="{FF2B5EF4-FFF2-40B4-BE49-F238E27FC236}">
+                <a16:creationId xmlns:a16="http://schemas.microsoft.com/office/drawing/2014/main" id="{616B3AC6-F485-480D-BD5D-588FBE1289B5}"/>
+              </a:ext>
+            </a:extLst>
+          </p:cNvPr>
+          <p:cNvGrpSpPr/>
+          <p:nvPr/>
+        </p:nvGrpSpPr>
+        <p:grpSpPr>
+          <a:xfrm>
+            <a:off x="4690047" y="2129362"/>
+            <a:ext cx="908850" cy="911444"/>
+            <a:chOff x="6012941" y="2098950"/>
+            <a:chExt cx="908850" cy="911444"/>
+          </a:xfrm>
+        </p:grpSpPr>
+        <p:sp>
+          <p:nvSpPr>
+            <p:cNvPr id="28" name="Freeform: Shape 27">
+              <a:extLst>
+                <a:ext uri="{FF2B5EF4-FFF2-40B4-BE49-F238E27FC236}">
+                  <a16:creationId xmlns:a16="http://schemas.microsoft.com/office/drawing/2014/main" id="{5C05385B-6041-435B-9493-3CC0FF4A9E75}"/>
+                </a:ext>
+              </a:extLst>
+            </p:cNvPr>
+            <p:cNvSpPr/>
+            <p:nvPr/>
+          </p:nvSpPr>
+          <p:spPr>
+            <a:xfrm rot="10800000">
+              <a:off x="6012941" y="2098950"/>
+              <a:ext cx="908850" cy="455722"/>
+            </a:xfrm>
+            <a:custGeom>
+              <a:avLst/>
+              <a:gdLst>
+                <a:gd name="connsiteX0" fmla="*/ 0 w 908850"/>
+                <a:gd name="connsiteY0" fmla="*/ 0 h 455722"/>
+                <a:gd name="connsiteX1" fmla="*/ 908850 w 908850"/>
+                <a:gd name="connsiteY1" fmla="*/ 0 h 455722"/>
+                <a:gd name="connsiteX2" fmla="*/ 453128 w 908850"/>
+                <a:gd name="connsiteY2" fmla="*/ 455722 h 455722"/>
+                <a:gd name="connsiteX3" fmla="*/ 0 w 908850"/>
+                <a:gd name="connsiteY3" fmla="*/ 2594 h 455722"/>
+              </a:gdLst>
+              <a:ahLst/>
+              <a:cxnLst>
+                <a:cxn ang="0">
+                  <a:pos x="connsiteX0" y="connsiteY0"/>
+                </a:cxn>
+                <a:cxn ang="0">
+                  <a:pos x="connsiteX1" y="connsiteY1"/>
+                </a:cxn>
+                <a:cxn ang="0">
+                  <a:pos x="connsiteX2" y="connsiteY2"/>
+                </a:cxn>
+                <a:cxn ang="0">
+                  <a:pos x="connsiteX3" y="connsiteY3"/>
+                </a:cxn>
+              </a:cxnLst>
+              <a:rect l="l" t="t" r="r" b="b"/>
+              <a:pathLst>
+                <a:path w="908850" h="455722">
+                  <a:moveTo>
+                    <a:pt x="0" y="0"/>
+                  </a:moveTo>
+                  <a:lnTo>
+                    <a:pt x="908850" y="0"/>
+                  </a:lnTo>
+                  <a:lnTo>
+                    <a:pt x="453128" y="455722"/>
+                  </a:lnTo>
+                  <a:lnTo>
+                    <a:pt x="0" y="2594"/>
+                  </a:lnTo>
+                  <a:close/>
+                </a:path>
+              </a:pathLst>
+            </a:custGeom>
+            <a:solidFill>
+              <a:schemeClr val="bg1"/>
+            </a:solidFill>
+            <a:ln>
+              <a:noFill/>
+            </a:ln>
+          </p:spPr>
+          <p:style>
+            <a:lnRef idx="2">
+              <a:schemeClr val="accent1">
+                <a:shade val="50000"/>
+              </a:schemeClr>
+            </a:lnRef>
+            <a:fillRef idx="1">
+              <a:schemeClr val="accent1"/>
+            </a:fillRef>
+            <a:effectRef idx="0">
+              <a:schemeClr val="accent1"/>
+            </a:effectRef>
+            <a:fontRef idx="minor">
+              <a:schemeClr val="lt1"/>
+            </a:fontRef>
+          </p:style>
+          <p:txBody>
+            <a:bodyPr wrap="square" rtlCol="0" anchor="ctr">
+              <a:noAutofit/>
+            </a:bodyPr>
+            <a:lstStyle/>
+            <a:p>
+              <a:pPr algn="ctr"/>
+              <a:endParaRPr lang="en-US"/>
+            </a:p>
+          </p:txBody>
+        </p:sp>
+        <p:sp>
+          <p:nvSpPr>
+            <p:cNvPr id="30" name="Freeform: Shape 29">
+              <a:extLst>
+                <a:ext uri="{FF2B5EF4-FFF2-40B4-BE49-F238E27FC236}">
+                  <a16:creationId xmlns:a16="http://schemas.microsoft.com/office/drawing/2014/main" id="{EDA26F2A-8F02-480D-9EDD-5D1806D1A007}"/>
+                </a:ext>
+              </a:extLst>
+            </p:cNvPr>
+            <p:cNvSpPr/>
+            <p:nvPr/>
+          </p:nvSpPr>
+          <p:spPr>
+            <a:xfrm>
+              <a:off x="6012941" y="2554672"/>
+              <a:ext cx="908850" cy="455722"/>
+            </a:xfrm>
+            <a:custGeom>
+              <a:avLst/>
+              <a:gdLst>
+                <a:gd name="connsiteX0" fmla="*/ 0 w 908850"/>
+                <a:gd name="connsiteY0" fmla="*/ 0 h 455722"/>
+                <a:gd name="connsiteX1" fmla="*/ 908850 w 908850"/>
+                <a:gd name="connsiteY1" fmla="*/ 0 h 455722"/>
+                <a:gd name="connsiteX2" fmla="*/ 453128 w 908850"/>
+                <a:gd name="connsiteY2" fmla="*/ 455722 h 455722"/>
+                <a:gd name="connsiteX3" fmla="*/ 0 w 908850"/>
+                <a:gd name="connsiteY3" fmla="*/ 2594 h 455722"/>
+              </a:gdLst>
+              <a:ahLst/>
+              <a:cxnLst>
+                <a:cxn ang="0">
+                  <a:pos x="connsiteX0" y="connsiteY0"/>
+                </a:cxn>
+                <a:cxn ang="0">
+                  <a:pos x="connsiteX1" y="connsiteY1"/>
+                </a:cxn>
+                <a:cxn ang="0">
+                  <a:pos x="connsiteX2" y="connsiteY2"/>
+                </a:cxn>
+                <a:cxn ang="0">
+                  <a:pos x="connsiteX3" y="connsiteY3"/>
+                </a:cxn>
+              </a:cxnLst>
+              <a:rect l="l" t="t" r="r" b="b"/>
+              <a:pathLst>
+                <a:path w="908850" h="455722">
+                  <a:moveTo>
+                    <a:pt x="0" y="0"/>
+                  </a:moveTo>
+                  <a:lnTo>
+                    <a:pt x="908850" y="0"/>
+                  </a:lnTo>
+                  <a:lnTo>
+                    <a:pt x="453128" y="455722"/>
+                  </a:lnTo>
+                  <a:lnTo>
+                    <a:pt x="0" y="2594"/>
+                  </a:lnTo>
+                  <a:close/>
+                </a:path>
+              </a:pathLst>
+            </a:custGeom>
+            <a:noFill/>
+            <a:ln>
+              <a:noFill/>
+            </a:ln>
+          </p:spPr>
+          <p:style>
+            <a:lnRef idx="2">
+              <a:schemeClr val="accent1">
+                <a:shade val="50000"/>
+              </a:schemeClr>
+            </a:lnRef>
+            <a:fillRef idx="1">
+              <a:schemeClr val="accent1"/>
+            </a:fillRef>
+            <a:effectRef idx="0">
+              <a:schemeClr val="accent1"/>
+            </a:effectRef>
+            <a:fontRef idx="minor">
+              <a:schemeClr val="lt1"/>
+            </a:fontRef>
+          </p:style>
+          <p:txBody>
+            <a:bodyPr wrap="square" rtlCol="0" anchor="ctr">
+              <a:noAutofit/>
+            </a:bodyPr>
+            <a:lstStyle/>
+            <a:p>
+              <a:pPr algn="ctr"/>
+              <a:endParaRPr lang="en-US"/>
+            </a:p>
+          </p:txBody>
+        </p:sp>
+      </p:grpSp>
+      <p:sp>
+        <p:nvSpPr>
+          <p:cNvPr id="6" name="Rectangle 5">
+            <a:extLst>
+              <a:ext uri="{FF2B5EF4-FFF2-40B4-BE49-F238E27FC236}">
+                <a16:creationId xmlns:a16="http://schemas.microsoft.com/office/drawing/2014/main" id="{800AC3EB-03EC-417F-A7AD-1C670A45C4C5}"/>
+              </a:ext>
+            </a:extLst>
+          </p:cNvPr>
+          <p:cNvSpPr/>
+          <p:nvPr/>
+        </p:nvSpPr>
+        <p:spPr>
+          <a:xfrm>
+            <a:off x="5850630" y="2098950"/>
+            <a:ext cx="908851" cy="908851"/>
+          </a:xfrm>
+          <a:prstGeom prst="rect">
+            <a:avLst/>
+          </a:prstGeom>
+          <a:solidFill>
+            <a:schemeClr val="bg1"/>
+          </a:solidFill>
+          <a:ln>
+            <a:noFill/>
+          </a:ln>
+        </p:spPr>
+        <p:style>
+          <a:lnRef idx="2">
+            <a:schemeClr val="accent1">
+              <a:shade val="50000"/>
+            </a:schemeClr>
+          </a:lnRef>
+          <a:fillRef idx="1">
+            <a:schemeClr val="accent1"/>
+          </a:fillRef>
+          <a:effectRef idx="0">
+            <a:schemeClr val="accent1"/>
+          </a:effectRef>
+          <a:fontRef idx="minor">
+            <a:schemeClr val="lt1"/>
+          </a:fontRef>
+        </p:style>
+        <p:txBody>
+          <a:bodyPr rtlCol="0" anchor="ctr"/>
+          <a:lstStyle/>
+          <a:p>
+            <a:pPr algn="ctr"/>
+            <a:endParaRPr lang="en-US"/>
+          </a:p>
+        </p:txBody>
+      </p:sp>
     </p:spTree>
     <p:extLst>
       <p:ext uri="{BB962C8B-B14F-4D97-AF65-F5344CB8AC3E}">

</xml_diff>